<commit_message>
clarify procedural generated level deliverable
</commit_message>
<xml_diff>
--- a/Presentations/Pitch_Presentation_Group_3.pptx
+++ b/Presentations/Pitch_Presentation_Group_3.pptx
@@ -267,35 +267,35 @@
           <a:p>
             <a:pPr lvl="0"/>
             <a:r>
-              <a:rPr lang="en-US" smtClean="0"/>
+              <a:rPr lang="en-US"/>
               <a:t>Edit Master text styles</a:t>
             </a:r>
           </a:p>
           <a:p>
             <a:pPr lvl="1"/>
             <a:r>
-              <a:rPr lang="en-US" smtClean="0"/>
+              <a:rPr lang="en-US"/>
               <a:t>Second level</a:t>
             </a:r>
           </a:p>
           <a:p>
             <a:pPr lvl="2"/>
             <a:r>
-              <a:rPr lang="en-US" smtClean="0"/>
+              <a:rPr lang="en-US"/>
               <a:t>Third level</a:t>
             </a:r>
           </a:p>
           <a:p>
             <a:pPr lvl="3"/>
             <a:r>
-              <a:rPr lang="en-US" smtClean="0"/>
+              <a:rPr lang="en-US"/>
               <a:t>Fourth level</a:t>
             </a:r>
           </a:p>
           <a:p>
             <a:pPr lvl="4"/>
             <a:r>
-              <a:rPr lang="en-US" smtClean="0"/>
+              <a:rPr lang="en-US"/>
               <a:t>Fifth level</a:t>
             </a:r>
             <a:endParaRPr lang="en-GB"/>
@@ -516,11 +516,11 @@
           <a:lstStyle/>
           <a:p>
             <a:r>
-              <a:rPr lang="en-GB" dirty="0" smtClean="0"/>
+              <a:rPr lang="en-GB" dirty="0"/>
               <a:t>So the</a:t>
             </a:r>
             <a:r>
-              <a:rPr lang="en-GB" baseline="0" dirty="0" smtClean="0"/>
+              <a:rPr lang="en-GB" baseline="0" dirty="0"/>
               <a:t> brief asks us to make a single-player game, pick a genre, select a mechanic and change it. So we made a Single-player 2D platformer game but instead of the player pressing Space to jump, the player will use the mouse to drag and drop tracks. The player will need to have quick reactions and fast decision-making when playing the game.</a:t>
             </a:r>
             <a:endParaRPr lang="en-GB" dirty="0"/>
@@ -608,24 +608,20 @@
           <a:lstStyle/>
           <a:p>
             <a:r>
-              <a:rPr lang="en-GB" dirty="0" smtClean="0"/>
+              <a:rPr lang="en-GB" dirty="0"/>
               <a:t>We want the player to experience</a:t>
             </a:r>
             <a:r>
-              <a:rPr lang="en-GB" baseline="0" dirty="0" smtClean="0"/>
+              <a:rPr lang="en-GB" baseline="0" dirty="0"/>
               <a:t> </a:t>
             </a:r>
             <a:r>
-              <a:rPr lang="en-GB" baseline="0" dirty="0" err="1" smtClean="0"/>
+              <a:rPr lang="en-GB" baseline="0" dirty="0" err="1"/>
               <a:t>Fiero</a:t>
             </a:r>
             <a:r>
-              <a:rPr lang="en-GB" baseline="0" dirty="0" smtClean="0"/>
-              <a:t>, a sense of triumph when a player either reaches a certain distance or score while collecting gold. Also create stress for the player, build tension through the constant need of fast reactions </a:t>
-            </a:r>
-            <a:r>
-              <a:rPr lang="en-GB" baseline="0" dirty="0" smtClean="0"/>
-              <a:t>and relief through the inevitable player death.</a:t>
+              <a:rPr lang="en-GB" baseline="0" dirty="0"/>
+              <a:t>, a sense of triumph when a player either reaches a certain distance or score while collecting gold. Also create stress for the player, build tension through the constant need of fast reactions and relief through the inevitable player death.</a:t>
             </a:r>
             <a:endParaRPr lang="en-GB" dirty="0"/>
           </a:p>
@@ -6722,7 +6718,7 @@
                 <a16:creationId xmlns:a16="http://schemas.microsoft.com/office/drawing/2014/main" id="{CE3D4922-3D1C-4679-9A86-15BFC1A252F0}"/>
               </a:ext>
               <a:ext uri="{C183D7F6-B498-43B3-948B-1728B52AA6E4}">
-                <adec:decorative xmlns="" xmlns:adec="http://schemas.microsoft.com/office/drawing/2017/decorative" val="1"/>
+                <adec:decorative xmlns:adec="http://schemas.microsoft.com/office/drawing/2017/decorative" val="1"/>
               </a:ext>
             </a:extLst>
           </p:cNvPr>
@@ -6782,7 +6778,7 @@
                 <a16:creationId xmlns:a16="http://schemas.microsoft.com/office/drawing/2014/main" id="{164E9BCF-1B67-4514-808C-A5DCBDEB4A85}"/>
               </a:ext>
               <a:ext uri="{C183D7F6-B498-43B3-948B-1728B52AA6E4}">
-                <adec:decorative xmlns="" xmlns:adec="http://schemas.microsoft.com/office/drawing/2017/decorative" val="1"/>
+                <adec:decorative xmlns:adec="http://schemas.microsoft.com/office/drawing/2017/decorative" val="1"/>
               </a:ext>
             </a:extLst>
           </p:cNvPr>
@@ -6965,7 +6961,7 @@
                 <a16:creationId xmlns:a16="http://schemas.microsoft.com/office/drawing/2014/main" id="{32238778-9D1D-45F4-BB78-76F208A224B4}"/>
               </a:ext>
               <a:ext uri="{C183D7F6-B498-43B3-948B-1728B52AA6E4}">
-                <adec:decorative xmlns="" xmlns:adec="http://schemas.microsoft.com/office/drawing/2017/decorative" val="1"/>
+                <adec:decorative xmlns:adec="http://schemas.microsoft.com/office/drawing/2017/decorative" val="1"/>
               </a:ext>
             </a:extLst>
           </p:cNvPr>
@@ -6996,7 +6992,7 @@
                   <a16:creationId xmlns:a16="http://schemas.microsoft.com/office/drawing/2014/main" id="{93667F4D-F2CD-4E50-BACC-24766910F77C}"/>
                 </a:ext>
                 <a:ext uri="{C183D7F6-B498-43B3-948B-1728B52AA6E4}">
-                  <adec:decorative xmlns="" xmlns:adec="http://schemas.microsoft.com/office/drawing/2017/decorative" val="1"/>
+                  <adec:decorative xmlns:adec="http://schemas.microsoft.com/office/drawing/2017/decorative" val="1"/>
                 </a:ext>
               </a:extLst>
             </p:cNvPr>
@@ -7057,7 +7053,7 @@
                   <a16:creationId xmlns:a16="http://schemas.microsoft.com/office/drawing/2014/main" id="{20CAAE25-D2F2-493F-9569-EC552C1ADD70}"/>
                 </a:ext>
                 <a:ext uri="{C183D7F6-B498-43B3-948B-1728B52AA6E4}">
-                  <adec:decorative xmlns="" xmlns:adec="http://schemas.microsoft.com/office/drawing/2017/decorative" val="1"/>
+                  <adec:decorative xmlns:adec="http://schemas.microsoft.com/office/drawing/2017/decorative" val="1"/>
                 </a:ext>
               </a:extLst>
             </p:cNvPr>
@@ -7121,7 +7117,7 @@
                   <a16:creationId xmlns:a16="http://schemas.microsoft.com/office/drawing/2014/main" id="{42D5E996-541D-42BA-8B22-F7E96752CE34}"/>
                 </a:ext>
                 <a:ext uri="{C183D7F6-B498-43B3-948B-1728B52AA6E4}">
-                  <adec:decorative xmlns="" xmlns:adec="http://schemas.microsoft.com/office/drawing/2017/decorative" val="1"/>
+                  <adec:decorative xmlns:adec="http://schemas.microsoft.com/office/drawing/2017/decorative" val="1"/>
                 </a:ext>
               </a:extLst>
             </p:cNvPr>
@@ -7182,7 +7178,7 @@
                   <a16:creationId xmlns:a16="http://schemas.microsoft.com/office/drawing/2014/main" id="{6BDB86F1-7C07-4D49-B9C9-7837A1FB2551}"/>
                 </a:ext>
                 <a:ext uri="{C183D7F6-B498-43B3-948B-1728B52AA6E4}">
-                  <adec:decorative xmlns="" xmlns:adec="http://schemas.microsoft.com/office/drawing/2017/decorative" val="1"/>
+                  <adec:decorative xmlns:adec="http://schemas.microsoft.com/office/drawing/2017/decorative" val="1"/>
                 </a:ext>
               </a:extLst>
             </p:cNvPr>
@@ -7242,7 +7238,7 @@
                   <a16:creationId xmlns:a16="http://schemas.microsoft.com/office/drawing/2014/main" id="{92FDEA97-0861-44C0-9B26-4BB5F777AE11}"/>
                 </a:ext>
                 <a:ext uri="{C183D7F6-B498-43B3-948B-1728B52AA6E4}">
-                  <adec:decorative xmlns="" xmlns:adec="http://schemas.microsoft.com/office/drawing/2017/decorative" val="1"/>
+                  <adec:decorative xmlns:adec="http://schemas.microsoft.com/office/drawing/2017/decorative" val="1"/>
                 </a:ext>
               </a:extLst>
             </p:cNvPr>
@@ -7308,7 +7304,7 @@
                   <a16:creationId xmlns:a16="http://schemas.microsoft.com/office/drawing/2014/main" id="{A9F3AA02-C861-444A-9178-0BD3D3CE16A1}"/>
                 </a:ext>
                 <a:ext uri="{C183D7F6-B498-43B3-948B-1728B52AA6E4}">
-                  <adec:decorative xmlns="" xmlns:adec="http://schemas.microsoft.com/office/drawing/2017/decorative" val="1"/>
+                  <adec:decorative xmlns:adec="http://schemas.microsoft.com/office/drawing/2017/decorative" val="1"/>
                 </a:ext>
               </a:extLst>
             </p:cNvPr>
@@ -7629,13 +7625,6 @@
   <p:clrMapOvr>
     <a:masterClrMapping/>
   </p:clrMapOvr>
-  <p:timing>
-    <p:tnLst>
-      <p:par>
-        <p:cTn id="1" dur="indefinite" restart="never" nodeType="tmRoot"/>
-      </p:par>
-    </p:tnLst>
-  </p:timing>
 </p:sld>
 </file>
 
@@ -7686,7 +7675,7 @@
                 <a16:creationId xmlns:a16="http://schemas.microsoft.com/office/drawing/2014/main" id="{C8643778-7F6C-4E8D-84D1-D5CDB9928191}"/>
               </a:ext>
               <a:ext uri="{C183D7F6-B498-43B3-948B-1728B52AA6E4}">
-                <adec:decorative xmlns="" xmlns:adec="http://schemas.microsoft.com/office/drawing/2017/decorative" val="1"/>
+                <adec:decorative xmlns:adec="http://schemas.microsoft.com/office/drawing/2017/decorative" val="1"/>
               </a:ext>
             </a:extLst>
           </p:cNvPr>
@@ -7746,7 +7735,7 @@
                 <a16:creationId xmlns:a16="http://schemas.microsoft.com/office/drawing/2014/main" id="{1D22F88D-6907-48AF-B024-346E855E0D96}"/>
               </a:ext>
               <a:ext uri="{C183D7F6-B498-43B3-948B-1728B52AA6E4}">
-                <adec:decorative xmlns="" xmlns:adec="http://schemas.microsoft.com/office/drawing/2017/decorative" val="1"/>
+                <adec:decorative xmlns:adec="http://schemas.microsoft.com/office/drawing/2017/decorative" val="1"/>
               </a:ext>
             </a:extLst>
           </p:cNvPr>
@@ -7956,21 +7945,8 @@
                   <a:srgbClr val="FFFFFF"/>
                 </a:solidFill>
               </a:rPr>
-              <a:t>Project </a:t>
+              <a:t>Project Brief/Solution</a:t>
             </a:r>
-            <a:r>
-              <a:rPr lang="en-US" sz="3200" dirty="0" smtClean="0">
-                <a:solidFill>
-                  <a:srgbClr val="FFFFFF"/>
-                </a:solidFill>
-              </a:rPr>
-              <a:t>Brief/Solution</a:t>
-            </a:r>
-            <a:endParaRPr lang="en-US" sz="3200" dirty="0">
-              <a:solidFill>
-                <a:srgbClr val="FFFFFF"/>
-              </a:solidFill>
-            </a:endParaRPr>
           </a:p>
         </p:txBody>
       </p:sp>
@@ -7982,7 +7958,7 @@
                 <a16:creationId xmlns:a16="http://schemas.microsoft.com/office/drawing/2014/main" id="{F3842748-48B5-4DD0-A06A-A31C74024A99}"/>
               </a:ext>
               <a:ext uri="{C183D7F6-B498-43B3-948B-1728B52AA6E4}">
-                <adec:decorative xmlns="" xmlns:adec="http://schemas.microsoft.com/office/drawing/2017/decorative" val="1"/>
+                <adec:decorative xmlns:adec="http://schemas.microsoft.com/office/drawing/2017/decorative" val="1"/>
               </a:ext>
             </a:extLst>
           </p:cNvPr>
@@ -8013,7 +7989,7 @@
                   <a16:creationId xmlns:a16="http://schemas.microsoft.com/office/drawing/2014/main" id="{548E99BE-1071-4690-9B9C-07926CEE5557}"/>
                 </a:ext>
                 <a:ext uri="{C183D7F6-B498-43B3-948B-1728B52AA6E4}">
-                  <adec:decorative xmlns="" xmlns:adec="http://schemas.microsoft.com/office/drawing/2017/decorative" val="1"/>
+                  <adec:decorative xmlns:adec="http://schemas.microsoft.com/office/drawing/2017/decorative" val="1"/>
                 </a:ext>
               </a:extLst>
             </p:cNvPr>
@@ -8074,7 +8050,7 @@
                   <a16:creationId xmlns:a16="http://schemas.microsoft.com/office/drawing/2014/main" id="{9301F039-B467-413A-B25C-770E51069D42}"/>
                 </a:ext>
                 <a:ext uri="{C183D7F6-B498-43B3-948B-1728B52AA6E4}">
-                  <adec:decorative xmlns="" xmlns:adec="http://schemas.microsoft.com/office/drawing/2017/decorative" val="1"/>
+                  <adec:decorative xmlns:adec="http://schemas.microsoft.com/office/drawing/2017/decorative" val="1"/>
                 </a:ext>
               </a:extLst>
             </p:cNvPr>
@@ -8138,7 +8114,7 @@
                   <a16:creationId xmlns:a16="http://schemas.microsoft.com/office/drawing/2014/main" id="{9F06AEC1-5558-49E8-8CAC-FEBD00DF0031}"/>
                 </a:ext>
                 <a:ext uri="{C183D7F6-B498-43B3-948B-1728B52AA6E4}">
-                  <adec:decorative xmlns="" xmlns:adec="http://schemas.microsoft.com/office/drawing/2017/decorative" val="1"/>
+                  <adec:decorative xmlns:adec="http://schemas.microsoft.com/office/drawing/2017/decorative" val="1"/>
                 </a:ext>
               </a:extLst>
             </p:cNvPr>
@@ -8199,7 +8175,7 @@
                   <a16:creationId xmlns:a16="http://schemas.microsoft.com/office/drawing/2014/main" id="{D10B76B9-BA68-471E-B58C-ED91198A9FAB}"/>
                 </a:ext>
                 <a:ext uri="{C183D7F6-B498-43B3-948B-1728B52AA6E4}">
-                  <adec:decorative xmlns="" xmlns:adec="http://schemas.microsoft.com/office/drawing/2017/decorative" val="1"/>
+                  <adec:decorative xmlns:adec="http://schemas.microsoft.com/office/drawing/2017/decorative" val="1"/>
                 </a:ext>
               </a:extLst>
             </p:cNvPr>
@@ -8259,7 +8235,7 @@
                   <a16:creationId xmlns:a16="http://schemas.microsoft.com/office/drawing/2014/main" id="{FEB3913B-54A3-490E-BA4B-5D0330990FCB}"/>
                 </a:ext>
                 <a:ext uri="{C183D7F6-B498-43B3-948B-1728B52AA6E4}">
-                  <adec:decorative xmlns="" xmlns:adec="http://schemas.microsoft.com/office/drawing/2017/decorative" val="1"/>
+                  <adec:decorative xmlns:adec="http://schemas.microsoft.com/office/drawing/2017/decorative" val="1"/>
                 </a:ext>
               </a:extLst>
             </p:cNvPr>
@@ -8325,7 +8301,7 @@
                   <a16:creationId xmlns:a16="http://schemas.microsoft.com/office/drawing/2014/main" id="{F75DC961-08A4-46F8-8A80-2E1FB977E1F4}"/>
                 </a:ext>
                 <a:ext uri="{C183D7F6-B498-43B3-948B-1728B52AA6E4}">
-                  <adec:decorative xmlns="" xmlns:adec="http://schemas.microsoft.com/office/drawing/2017/decorative" val="1"/>
+                  <adec:decorative xmlns:adec="http://schemas.microsoft.com/office/drawing/2017/decorative" val="1"/>
                 </a:ext>
               </a:extLst>
             </p:cNvPr>
@@ -8426,21 +8402,17 @@
           <a:lstStyle/>
           <a:p>
             <a:r>
-              <a:rPr lang="en-US" sz="2000" dirty="0" smtClean="0"/>
+              <a:rPr lang="en-US" sz="2000" dirty="0"/>
               <a:t>Single player.</a:t>
             </a:r>
           </a:p>
           <a:p>
-            <a:endParaRPr lang="en-US" sz="2000" dirty="0" smtClean="0"/>
-          </a:p>
-          <a:p>
-            <a:r>
-              <a:rPr lang="en-US" sz="2000" dirty="0" smtClean="0"/>
-              <a:t>2D </a:t>
-            </a:r>
+            <a:endParaRPr lang="en-US" sz="2000" dirty="0"/>
+          </a:p>
+          <a:p>
             <a:r>
               <a:rPr lang="en-US" sz="2000" dirty="0"/>
-              <a:t>Platformer game</a:t>
+              <a:t>2D Platformer game</a:t>
             </a:r>
           </a:p>
           <a:p>
@@ -8458,15 +8430,7 @@
           <a:p>
             <a:r>
               <a:rPr lang="en-US" sz="2000" dirty="0"/>
-              <a:t>Player needs to have quick </a:t>
-            </a:r>
-            <a:r>
-              <a:rPr lang="en-US" sz="2000" dirty="0" smtClean="0"/>
-              <a:t>reactions </a:t>
-            </a:r>
-            <a:r>
-              <a:rPr lang="en-US" sz="2000" dirty="0"/>
-              <a:t>and fast decision making</a:t>
+              <a:t>Player needs to have quick reactions and fast decision making</a:t>
             </a:r>
           </a:p>
           <a:p>
@@ -8559,13 +8523,6 @@
   <p:clrMapOvr>
     <a:masterClrMapping/>
   </p:clrMapOvr>
-  <p:timing>
-    <p:tnLst>
-      <p:par>
-        <p:cTn id="1" dur="indefinite" restart="never" nodeType="tmRoot"/>
-      </p:par>
-    </p:tnLst>
-  </p:timing>
 </p:sld>
 </file>
 
@@ -8616,7 +8573,7 @@
                 <a16:creationId xmlns:a16="http://schemas.microsoft.com/office/drawing/2014/main" id="{C8643778-7F6C-4E8D-84D1-D5CDB9928191}"/>
               </a:ext>
               <a:ext uri="{C183D7F6-B498-43B3-948B-1728B52AA6E4}">
-                <adec:decorative xmlns="" xmlns:adec="http://schemas.microsoft.com/office/drawing/2017/decorative" val="1"/>
+                <adec:decorative xmlns:adec="http://schemas.microsoft.com/office/drawing/2017/decorative" val="1"/>
               </a:ext>
             </a:extLst>
           </p:cNvPr>
@@ -8676,7 +8633,7 @@
                 <a16:creationId xmlns:a16="http://schemas.microsoft.com/office/drawing/2014/main" id="{1D22F88D-6907-48AF-B024-346E855E0D96}"/>
               </a:ext>
               <a:ext uri="{C183D7F6-B498-43B3-948B-1728B52AA6E4}">
-                <adec:decorative xmlns="" xmlns:adec="http://schemas.microsoft.com/office/drawing/2017/decorative" val="1"/>
+                <adec:decorative xmlns:adec="http://schemas.microsoft.com/office/drawing/2017/decorative" val="1"/>
               </a:ext>
             </a:extLst>
           </p:cNvPr>
@@ -8899,7 +8856,7 @@
                 <a16:creationId xmlns:a16="http://schemas.microsoft.com/office/drawing/2014/main" id="{F3842748-48B5-4DD0-A06A-A31C74024A99}"/>
               </a:ext>
               <a:ext uri="{C183D7F6-B498-43B3-948B-1728B52AA6E4}">
-                <adec:decorative xmlns="" xmlns:adec="http://schemas.microsoft.com/office/drawing/2017/decorative" val="1"/>
+                <adec:decorative xmlns:adec="http://schemas.microsoft.com/office/drawing/2017/decorative" val="1"/>
               </a:ext>
             </a:extLst>
           </p:cNvPr>
@@ -8930,7 +8887,7 @@
                   <a16:creationId xmlns:a16="http://schemas.microsoft.com/office/drawing/2014/main" id="{548E99BE-1071-4690-9B9C-07926CEE5557}"/>
                 </a:ext>
                 <a:ext uri="{C183D7F6-B498-43B3-948B-1728B52AA6E4}">
-                  <adec:decorative xmlns="" xmlns:adec="http://schemas.microsoft.com/office/drawing/2017/decorative" val="1"/>
+                  <adec:decorative xmlns:adec="http://schemas.microsoft.com/office/drawing/2017/decorative" val="1"/>
                 </a:ext>
               </a:extLst>
             </p:cNvPr>
@@ -8991,7 +8948,7 @@
                   <a16:creationId xmlns:a16="http://schemas.microsoft.com/office/drawing/2014/main" id="{9301F039-B467-413A-B25C-770E51069D42}"/>
                 </a:ext>
                 <a:ext uri="{C183D7F6-B498-43B3-948B-1728B52AA6E4}">
-                  <adec:decorative xmlns="" xmlns:adec="http://schemas.microsoft.com/office/drawing/2017/decorative" val="1"/>
+                  <adec:decorative xmlns:adec="http://schemas.microsoft.com/office/drawing/2017/decorative" val="1"/>
                 </a:ext>
               </a:extLst>
             </p:cNvPr>
@@ -9055,7 +9012,7 @@
                   <a16:creationId xmlns:a16="http://schemas.microsoft.com/office/drawing/2014/main" id="{9F06AEC1-5558-49E8-8CAC-FEBD00DF0031}"/>
                 </a:ext>
                 <a:ext uri="{C183D7F6-B498-43B3-948B-1728B52AA6E4}">
-                  <adec:decorative xmlns="" xmlns:adec="http://schemas.microsoft.com/office/drawing/2017/decorative" val="1"/>
+                  <adec:decorative xmlns:adec="http://schemas.microsoft.com/office/drawing/2017/decorative" val="1"/>
                 </a:ext>
               </a:extLst>
             </p:cNvPr>
@@ -9116,7 +9073,7 @@
                   <a16:creationId xmlns:a16="http://schemas.microsoft.com/office/drawing/2014/main" id="{D10B76B9-BA68-471E-B58C-ED91198A9FAB}"/>
                 </a:ext>
                 <a:ext uri="{C183D7F6-B498-43B3-948B-1728B52AA6E4}">
-                  <adec:decorative xmlns="" xmlns:adec="http://schemas.microsoft.com/office/drawing/2017/decorative" val="1"/>
+                  <adec:decorative xmlns:adec="http://schemas.microsoft.com/office/drawing/2017/decorative" val="1"/>
                 </a:ext>
               </a:extLst>
             </p:cNvPr>
@@ -9176,7 +9133,7 @@
                   <a16:creationId xmlns:a16="http://schemas.microsoft.com/office/drawing/2014/main" id="{FEB3913B-54A3-490E-BA4B-5D0330990FCB}"/>
                 </a:ext>
                 <a:ext uri="{C183D7F6-B498-43B3-948B-1728B52AA6E4}">
-                  <adec:decorative xmlns="" xmlns:adec="http://schemas.microsoft.com/office/drawing/2017/decorative" val="1"/>
+                  <adec:decorative xmlns:adec="http://schemas.microsoft.com/office/drawing/2017/decorative" val="1"/>
                 </a:ext>
               </a:extLst>
             </p:cNvPr>
@@ -9242,7 +9199,7 @@
                   <a16:creationId xmlns:a16="http://schemas.microsoft.com/office/drawing/2014/main" id="{F75DC961-08A4-46F8-8A80-2E1FB977E1F4}"/>
                 </a:ext>
                 <a:ext uri="{C183D7F6-B498-43B3-948B-1728B52AA6E4}">
-                  <adec:decorative xmlns="" xmlns:adec="http://schemas.microsoft.com/office/drawing/2017/decorative" val="1"/>
+                  <adec:decorative xmlns:adec="http://schemas.microsoft.com/office/drawing/2017/decorative" val="1"/>
                 </a:ext>
               </a:extLst>
             </p:cNvPr>
@@ -9832,13 +9789,6 @@
   <p:clrMapOvr>
     <a:masterClrMapping/>
   </p:clrMapOvr>
-  <p:timing>
-    <p:tnLst>
-      <p:par>
-        <p:cTn id="1" dur="indefinite" restart="never" nodeType="tmRoot"/>
-      </p:par>
-    </p:tnLst>
-  </p:timing>
 </p:sld>
 </file>
 
@@ -9889,7 +9839,7 @@
                 <a16:creationId xmlns:a16="http://schemas.microsoft.com/office/drawing/2014/main" id="{C8643778-7F6C-4E8D-84D1-D5CDB9928191}"/>
               </a:ext>
               <a:ext uri="{C183D7F6-B498-43B3-948B-1728B52AA6E4}">
-                <adec:decorative xmlns="" xmlns:adec="http://schemas.microsoft.com/office/drawing/2017/decorative" val="1"/>
+                <adec:decorative xmlns:adec="http://schemas.microsoft.com/office/drawing/2017/decorative" val="1"/>
               </a:ext>
             </a:extLst>
           </p:cNvPr>
@@ -9949,7 +9899,7 @@
                 <a16:creationId xmlns:a16="http://schemas.microsoft.com/office/drawing/2014/main" id="{1D22F88D-6907-48AF-B024-346E855E0D96}"/>
               </a:ext>
               <a:ext uri="{C183D7F6-B498-43B3-948B-1728B52AA6E4}">
-                <adec:decorative xmlns="" xmlns:adec="http://schemas.microsoft.com/office/drawing/2017/decorative" val="1"/>
+                <adec:decorative xmlns:adec="http://schemas.microsoft.com/office/drawing/2017/decorative" val="1"/>
               </a:ext>
             </a:extLst>
           </p:cNvPr>
@@ -10172,7 +10122,7 @@
                 <a16:creationId xmlns:a16="http://schemas.microsoft.com/office/drawing/2014/main" id="{F3842748-48B5-4DD0-A06A-A31C74024A99}"/>
               </a:ext>
               <a:ext uri="{C183D7F6-B498-43B3-948B-1728B52AA6E4}">
-                <adec:decorative xmlns="" xmlns:adec="http://schemas.microsoft.com/office/drawing/2017/decorative" val="1"/>
+                <adec:decorative xmlns:adec="http://schemas.microsoft.com/office/drawing/2017/decorative" val="1"/>
               </a:ext>
             </a:extLst>
           </p:cNvPr>
@@ -10203,7 +10153,7 @@
                   <a16:creationId xmlns:a16="http://schemas.microsoft.com/office/drawing/2014/main" id="{548E99BE-1071-4690-9B9C-07926CEE5557}"/>
                 </a:ext>
                 <a:ext uri="{C183D7F6-B498-43B3-948B-1728B52AA6E4}">
-                  <adec:decorative xmlns="" xmlns:adec="http://schemas.microsoft.com/office/drawing/2017/decorative" val="1"/>
+                  <adec:decorative xmlns:adec="http://schemas.microsoft.com/office/drawing/2017/decorative" val="1"/>
                 </a:ext>
               </a:extLst>
             </p:cNvPr>
@@ -10264,7 +10214,7 @@
                   <a16:creationId xmlns:a16="http://schemas.microsoft.com/office/drawing/2014/main" id="{9301F039-B467-413A-B25C-770E51069D42}"/>
                 </a:ext>
                 <a:ext uri="{C183D7F6-B498-43B3-948B-1728B52AA6E4}">
-                  <adec:decorative xmlns="" xmlns:adec="http://schemas.microsoft.com/office/drawing/2017/decorative" val="1"/>
+                  <adec:decorative xmlns:adec="http://schemas.microsoft.com/office/drawing/2017/decorative" val="1"/>
                 </a:ext>
               </a:extLst>
             </p:cNvPr>
@@ -10328,7 +10278,7 @@
                   <a16:creationId xmlns:a16="http://schemas.microsoft.com/office/drawing/2014/main" id="{9F06AEC1-5558-49E8-8CAC-FEBD00DF0031}"/>
                 </a:ext>
                 <a:ext uri="{C183D7F6-B498-43B3-948B-1728B52AA6E4}">
-                  <adec:decorative xmlns="" xmlns:adec="http://schemas.microsoft.com/office/drawing/2017/decorative" val="1"/>
+                  <adec:decorative xmlns:adec="http://schemas.microsoft.com/office/drawing/2017/decorative" val="1"/>
                 </a:ext>
               </a:extLst>
             </p:cNvPr>
@@ -10389,7 +10339,7 @@
                   <a16:creationId xmlns:a16="http://schemas.microsoft.com/office/drawing/2014/main" id="{D10B76B9-BA68-471E-B58C-ED91198A9FAB}"/>
                 </a:ext>
                 <a:ext uri="{C183D7F6-B498-43B3-948B-1728B52AA6E4}">
-                  <adec:decorative xmlns="" xmlns:adec="http://schemas.microsoft.com/office/drawing/2017/decorative" val="1"/>
+                  <adec:decorative xmlns:adec="http://schemas.microsoft.com/office/drawing/2017/decorative" val="1"/>
                 </a:ext>
               </a:extLst>
             </p:cNvPr>
@@ -10449,7 +10399,7 @@
                   <a16:creationId xmlns:a16="http://schemas.microsoft.com/office/drawing/2014/main" id="{FEB3913B-54A3-490E-BA4B-5D0330990FCB}"/>
                 </a:ext>
                 <a:ext uri="{C183D7F6-B498-43B3-948B-1728B52AA6E4}">
-                  <adec:decorative xmlns="" xmlns:adec="http://schemas.microsoft.com/office/drawing/2017/decorative" val="1"/>
+                  <adec:decorative xmlns:adec="http://schemas.microsoft.com/office/drawing/2017/decorative" val="1"/>
                 </a:ext>
               </a:extLst>
             </p:cNvPr>
@@ -10515,7 +10465,7 @@
                   <a16:creationId xmlns:a16="http://schemas.microsoft.com/office/drawing/2014/main" id="{F75DC961-08A4-46F8-8A80-2E1FB977E1F4}"/>
                 </a:ext>
                 <a:ext uri="{C183D7F6-B498-43B3-948B-1728B52AA6E4}">
-                  <adec:decorative xmlns="" xmlns:adec="http://schemas.microsoft.com/office/drawing/2017/decorative" val="1"/>
+                  <adec:decorative xmlns:adec="http://schemas.microsoft.com/office/drawing/2017/decorative" val="1"/>
                 </a:ext>
               </a:extLst>
             </p:cNvPr>
@@ -10669,13 +10619,6 @@
   <p:clrMapOvr>
     <a:masterClrMapping/>
   </p:clrMapOvr>
-  <p:timing>
-    <p:tnLst>
-      <p:par>
-        <p:cTn id="1" dur="indefinite" restart="never" nodeType="tmRoot"/>
-      </p:par>
-    </p:tnLst>
-  </p:timing>
 </p:sld>
 </file>
 
@@ -10726,7 +10669,7 @@
                 <a16:creationId xmlns:a16="http://schemas.microsoft.com/office/drawing/2014/main" id="{C8643778-7F6C-4E8D-84D1-D5CDB9928191}"/>
               </a:ext>
               <a:ext uri="{C183D7F6-B498-43B3-948B-1728B52AA6E4}">
-                <adec:decorative xmlns="" xmlns:adec="http://schemas.microsoft.com/office/drawing/2017/decorative" val="1"/>
+                <adec:decorative xmlns:adec="http://schemas.microsoft.com/office/drawing/2017/decorative" val="1"/>
               </a:ext>
             </a:extLst>
           </p:cNvPr>
@@ -10786,7 +10729,7 @@
                 <a16:creationId xmlns:a16="http://schemas.microsoft.com/office/drawing/2014/main" id="{1D22F88D-6907-48AF-B024-346E855E0D96}"/>
               </a:ext>
               <a:ext uri="{C183D7F6-B498-43B3-948B-1728B52AA6E4}">
-                <adec:decorative xmlns="" xmlns:adec="http://schemas.microsoft.com/office/drawing/2017/decorative" val="1"/>
+                <adec:decorative xmlns:adec="http://schemas.microsoft.com/office/drawing/2017/decorative" val="1"/>
               </a:ext>
             </a:extLst>
           </p:cNvPr>
@@ -11009,7 +10952,7 @@
                 <a16:creationId xmlns:a16="http://schemas.microsoft.com/office/drawing/2014/main" id="{F3842748-48B5-4DD0-A06A-A31C74024A99}"/>
               </a:ext>
               <a:ext uri="{C183D7F6-B498-43B3-948B-1728B52AA6E4}">
-                <adec:decorative xmlns="" xmlns:adec="http://schemas.microsoft.com/office/drawing/2017/decorative" val="1"/>
+                <adec:decorative xmlns:adec="http://schemas.microsoft.com/office/drawing/2017/decorative" val="1"/>
               </a:ext>
             </a:extLst>
           </p:cNvPr>
@@ -11040,7 +10983,7 @@
                   <a16:creationId xmlns:a16="http://schemas.microsoft.com/office/drawing/2014/main" id="{548E99BE-1071-4690-9B9C-07926CEE5557}"/>
                 </a:ext>
                 <a:ext uri="{C183D7F6-B498-43B3-948B-1728B52AA6E4}">
-                  <adec:decorative xmlns="" xmlns:adec="http://schemas.microsoft.com/office/drawing/2017/decorative" val="1"/>
+                  <adec:decorative xmlns:adec="http://schemas.microsoft.com/office/drawing/2017/decorative" val="1"/>
                 </a:ext>
               </a:extLst>
             </p:cNvPr>
@@ -11101,7 +11044,7 @@
                   <a16:creationId xmlns:a16="http://schemas.microsoft.com/office/drawing/2014/main" id="{9301F039-B467-413A-B25C-770E51069D42}"/>
                 </a:ext>
                 <a:ext uri="{C183D7F6-B498-43B3-948B-1728B52AA6E4}">
-                  <adec:decorative xmlns="" xmlns:adec="http://schemas.microsoft.com/office/drawing/2017/decorative" val="1"/>
+                  <adec:decorative xmlns:adec="http://schemas.microsoft.com/office/drawing/2017/decorative" val="1"/>
                 </a:ext>
               </a:extLst>
             </p:cNvPr>
@@ -11165,7 +11108,7 @@
                   <a16:creationId xmlns:a16="http://schemas.microsoft.com/office/drawing/2014/main" id="{9F06AEC1-5558-49E8-8CAC-FEBD00DF0031}"/>
                 </a:ext>
                 <a:ext uri="{C183D7F6-B498-43B3-948B-1728B52AA6E4}">
-                  <adec:decorative xmlns="" xmlns:adec="http://schemas.microsoft.com/office/drawing/2017/decorative" val="1"/>
+                  <adec:decorative xmlns:adec="http://schemas.microsoft.com/office/drawing/2017/decorative" val="1"/>
                 </a:ext>
               </a:extLst>
             </p:cNvPr>
@@ -11226,7 +11169,7 @@
                   <a16:creationId xmlns:a16="http://schemas.microsoft.com/office/drawing/2014/main" id="{D10B76B9-BA68-471E-B58C-ED91198A9FAB}"/>
                 </a:ext>
                 <a:ext uri="{C183D7F6-B498-43B3-948B-1728B52AA6E4}">
-                  <adec:decorative xmlns="" xmlns:adec="http://schemas.microsoft.com/office/drawing/2017/decorative" val="1"/>
+                  <adec:decorative xmlns:adec="http://schemas.microsoft.com/office/drawing/2017/decorative" val="1"/>
                 </a:ext>
               </a:extLst>
             </p:cNvPr>
@@ -11286,7 +11229,7 @@
                   <a16:creationId xmlns:a16="http://schemas.microsoft.com/office/drawing/2014/main" id="{FEB3913B-54A3-490E-BA4B-5D0330990FCB}"/>
                 </a:ext>
                 <a:ext uri="{C183D7F6-B498-43B3-948B-1728B52AA6E4}">
-                  <adec:decorative xmlns="" xmlns:adec="http://schemas.microsoft.com/office/drawing/2017/decorative" val="1"/>
+                  <adec:decorative xmlns:adec="http://schemas.microsoft.com/office/drawing/2017/decorative" val="1"/>
                 </a:ext>
               </a:extLst>
             </p:cNvPr>
@@ -11352,7 +11295,7 @@
                   <a16:creationId xmlns:a16="http://schemas.microsoft.com/office/drawing/2014/main" id="{F75DC961-08A4-46F8-8A80-2E1FB977E1F4}"/>
                 </a:ext>
                 <a:ext uri="{C183D7F6-B498-43B3-948B-1728B52AA6E4}">
-                  <adec:decorative xmlns="" xmlns:adec="http://schemas.microsoft.com/office/drawing/2017/decorative" val="1"/>
+                  <adec:decorative xmlns:adec="http://schemas.microsoft.com/office/drawing/2017/decorative" val="1"/>
                 </a:ext>
               </a:extLst>
             </p:cNvPr>
@@ -11920,28 +11863,16 @@
           <a:p>
             <a:r>
               <a:rPr lang="en-US" sz="2000" dirty="0"/>
-              <a:t>Building tension through constant need of fast reactions and </a:t>
+              <a:t>Building tension through constant need of fast reactions and upcoming obstacles</a:t>
             </a:r>
-            <a:r>
-              <a:rPr lang="en-US" sz="2000" dirty="0" smtClean="0"/>
-              <a:t>upcoming </a:t>
-            </a:r>
+          </a:p>
+          <a:p>
+            <a:endParaRPr lang="en-US" sz="2000" dirty="0"/>
+          </a:p>
+          <a:p>
             <a:r>
               <a:rPr lang="en-US" sz="2000" dirty="0"/>
-              <a:t>obstacles</a:t>
-            </a:r>
-          </a:p>
-          <a:p>
-            <a:endParaRPr lang="en-US" sz="2000" dirty="0"/>
-          </a:p>
-          <a:p>
-            <a:r>
-              <a:rPr lang="en-US" sz="2000" dirty="0" smtClean="0"/>
-              <a:t>Relief </a:t>
-            </a:r>
-            <a:r>
-              <a:rPr lang="en-US" sz="2000" dirty="0"/>
-              <a:t>through the inevitable player death</a:t>
+              <a:t>Relief through the inevitable player death</a:t>
             </a:r>
           </a:p>
         </p:txBody>
@@ -11956,13 +11887,6 @@
   <p:clrMapOvr>
     <a:masterClrMapping/>
   </p:clrMapOvr>
-  <p:timing>
-    <p:tnLst>
-      <p:par>
-        <p:cTn id="1" dur="indefinite" restart="never" nodeType="tmRoot"/>
-      </p:par>
-    </p:tnLst>
-  </p:timing>
 </p:sld>
 </file>
 
@@ -12013,7 +11937,7 @@
                 <a16:creationId xmlns:a16="http://schemas.microsoft.com/office/drawing/2014/main" id="{C8643778-7F6C-4E8D-84D1-D5CDB9928191}"/>
               </a:ext>
               <a:ext uri="{C183D7F6-B498-43B3-948B-1728B52AA6E4}">
-                <adec:decorative xmlns="" xmlns:adec="http://schemas.microsoft.com/office/drawing/2017/decorative" val="1"/>
+                <adec:decorative xmlns:adec="http://schemas.microsoft.com/office/drawing/2017/decorative" val="1"/>
               </a:ext>
             </a:extLst>
           </p:cNvPr>
@@ -12073,7 +11997,7 @@
                 <a16:creationId xmlns:a16="http://schemas.microsoft.com/office/drawing/2014/main" id="{1D22F88D-6907-48AF-B024-346E855E0D96}"/>
               </a:ext>
               <a:ext uri="{C183D7F6-B498-43B3-948B-1728B52AA6E4}">
-                <adec:decorative xmlns="" xmlns:adec="http://schemas.microsoft.com/office/drawing/2017/decorative" val="1"/>
+                <adec:decorative xmlns:adec="http://schemas.microsoft.com/office/drawing/2017/decorative" val="1"/>
               </a:ext>
             </a:extLst>
           </p:cNvPr>
@@ -12278,7 +12202,7 @@
           <a:p>
             <a:pPr algn="l"/>
             <a:r>
-              <a:rPr lang="en-US" sz="3200" dirty="0" err="1" smtClean="0">
+              <a:rPr lang="en-US" sz="3200" dirty="0" err="1">
                 <a:solidFill>
                   <a:srgbClr val="FFFFFF"/>
                 </a:solidFill>
@@ -12301,7 +12225,7 @@
                 <a16:creationId xmlns:a16="http://schemas.microsoft.com/office/drawing/2014/main" id="{F3842748-48B5-4DD0-A06A-A31C74024A99}"/>
               </a:ext>
               <a:ext uri="{C183D7F6-B498-43B3-948B-1728B52AA6E4}">
-                <adec:decorative xmlns="" xmlns:adec="http://schemas.microsoft.com/office/drawing/2017/decorative" val="1"/>
+                <adec:decorative xmlns:adec="http://schemas.microsoft.com/office/drawing/2017/decorative" val="1"/>
               </a:ext>
             </a:extLst>
           </p:cNvPr>
@@ -12332,7 +12256,7 @@
                   <a16:creationId xmlns:a16="http://schemas.microsoft.com/office/drawing/2014/main" id="{548E99BE-1071-4690-9B9C-07926CEE5557}"/>
                 </a:ext>
                 <a:ext uri="{C183D7F6-B498-43B3-948B-1728B52AA6E4}">
-                  <adec:decorative xmlns="" xmlns:adec="http://schemas.microsoft.com/office/drawing/2017/decorative" val="1"/>
+                  <adec:decorative xmlns:adec="http://schemas.microsoft.com/office/drawing/2017/decorative" val="1"/>
                 </a:ext>
               </a:extLst>
             </p:cNvPr>
@@ -12393,7 +12317,7 @@
                   <a16:creationId xmlns:a16="http://schemas.microsoft.com/office/drawing/2014/main" id="{9301F039-B467-413A-B25C-770E51069D42}"/>
                 </a:ext>
                 <a:ext uri="{C183D7F6-B498-43B3-948B-1728B52AA6E4}">
-                  <adec:decorative xmlns="" xmlns:adec="http://schemas.microsoft.com/office/drawing/2017/decorative" val="1"/>
+                  <adec:decorative xmlns:adec="http://schemas.microsoft.com/office/drawing/2017/decorative" val="1"/>
                 </a:ext>
               </a:extLst>
             </p:cNvPr>
@@ -12457,7 +12381,7 @@
                   <a16:creationId xmlns:a16="http://schemas.microsoft.com/office/drawing/2014/main" id="{9F06AEC1-5558-49E8-8CAC-FEBD00DF0031}"/>
                 </a:ext>
                 <a:ext uri="{C183D7F6-B498-43B3-948B-1728B52AA6E4}">
-                  <adec:decorative xmlns="" xmlns:adec="http://schemas.microsoft.com/office/drawing/2017/decorative" val="1"/>
+                  <adec:decorative xmlns:adec="http://schemas.microsoft.com/office/drawing/2017/decorative" val="1"/>
                 </a:ext>
               </a:extLst>
             </p:cNvPr>
@@ -12518,7 +12442,7 @@
                   <a16:creationId xmlns:a16="http://schemas.microsoft.com/office/drawing/2014/main" id="{D10B76B9-BA68-471E-B58C-ED91198A9FAB}"/>
                 </a:ext>
                 <a:ext uri="{C183D7F6-B498-43B3-948B-1728B52AA6E4}">
-                  <adec:decorative xmlns="" xmlns:adec="http://schemas.microsoft.com/office/drawing/2017/decorative" val="1"/>
+                  <adec:decorative xmlns:adec="http://schemas.microsoft.com/office/drawing/2017/decorative" val="1"/>
                 </a:ext>
               </a:extLst>
             </p:cNvPr>
@@ -12578,7 +12502,7 @@
                   <a16:creationId xmlns:a16="http://schemas.microsoft.com/office/drawing/2014/main" id="{FEB3913B-54A3-490E-BA4B-5D0330990FCB}"/>
                 </a:ext>
                 <a:ext uri="{C183D7F6-B498-43B3-948B-1728B52AA6E4}">
-                  <adec:decorative xmlns="" xmlns:adec="http://schemas.microsoft.com/office/drawing/2017/decorative" val="1"/>
+                  <adec:decorative xmlns:adec="http://schemas.microsoft.com/office/drawing/2017/decorative" val="1"/>
                 </a:ext>
               </a:extLst>
             </p:cNvPr>
@@ -12644,7 +12568,7 @@
                   <a16:creationId xmlns:a16="http://schemas.microsoft.com/office/drawing/2014/main" id="{F75DC961-08A4-46F8-8A80-2E1FB977E1F4}"/>
                 </a:ext>
                 <a:ext uri="{C183D7F6-B498-43B3-948B-1728B52AA6E4}">
-                  <adec:decorative xmlns="" xmlns:adec="http://schemas.microsoft.com/office/drawing/2017/decorative" val="1"/>
+                  <adec:decorative xmlns:adec="http://schemas.microsoft.com/office/drawing/2017/decorative" val="1"/>
                 </a:ext>
               </a:extLst>
             </p:cNvPr>
@@ -12734,8 +12658,8 @@
         </p:nvSpPr>
         <p:spPr>
           <a:xfrm>
-            <a:off x="5117106" y="685801"/>
-            <a:ext cx="6385918" cy="5105400"/>
+            <a:off x="5117105" y="381002"/>
+            <a:ext cx="6681317" cy="5105400"/>
           </a:xfrm>
         </p:spPr>
         <p:txBody>
@@ -12746,7 +12670,7 @@
           <a:p>
             <a:r>
               <a:rPr lang="en-US" sz="2000" dirty="0"/>
-              <a:t>Random generated assets in the level</a:t>
+              <a:t>Procedural level generation to make a true endless runner</a:t>
             </a:r>
           </a:p>
           <a:p>
@@ -12839,13 +12763,6 @@
   <p:clrMapOvr>
     <a:masterClrMapping/>
   </p:clrMapOvr>
-  <p:timing>
-    <p:tnLst>
-      <p:par>
-        <p:cTn id="1" dur="indefinite" restart="never" nodeType="tmRoot"/>
-      </p:par>
-    </p:tnLst>
-  </p:timing>
 </p:sld>
 </file>
 
@@ -12896,7 +12813,7 @@
                 <a16:creationId xmlns:a16="http://schemas.microsoft.com/office/drawing/2014/main" id="{C8643778-7F6C-4E8D-84D1-D5CDB9928191}"/>
               </a:ext>
               <a:ext uri="{C183D7F6-B498-43B3-948B-1728B52AA6E4}">
-                <adec:decorative xmlns="" xmlns:adec="http://schemas.microsoft.com/office/drawing/2017/decorative" val="1"/>
+                <adec:decorative xmlns:adec="http://schemas.microsoft.com/office/drawing/2017/decorative" val="1"/>
               </a:ext>
             </a:extLst>
           </p:cNvPr>
@@ -12956,7 +12873,7 @@
                 <a16:creationId xmlns:a16="http://schemas.microsoft.com/office/drawing/2014/main" id="{1D22F88D-6907-48AF-B024-346E855E0D96}"/>
               </a:ext>
               <a:ext uri="{C183D7F6-B498-43B3-948B-1728B52AA6E4}">
-                <adec:decorative xmlns="" xmlns:adec="http://schemas.microsoft.com/office/drawing/2017/decorative" val="1"/>
+                <adec:decorative xmlns:adec="http://schemas.microsoft.com/office/drawing/2017/decorative" val="1"/>
               </a:ext>
             </a:extLst>
           </p:cNvPr>
@@ -13179,7 +13096,7 @@
                 <a16:creationId xmlns:a16="http://schemas.microsoft.com/office/drawing/2014/main" id="{F3842748-48B5-4DD0-A06A-A31C74024A99}"/>
               </a:ext>
               <a:ext uri="{C183D7F6-B498-43B3-948B-1728B52AA6E4}">
-                <adec:decorative xmlns="" xmlns:adec="http://schemas.microsoft.com/office/drawing/2017/decorative" val="1"/>
+                <adec:decorative xmlns:adec="http://schemas.microsoft.com/office/drawing/2017/decorative" val="1"/>
               </a:ext>
             </a:extLst>
           </p:cNvPr>
@@ -13210,7 +13127,7 @@
                   <a16:creationId xmlns:a16="http://schemas.microsoft.com/office/drawing/2014/main" id="{548E99BE-1071-4690-9B9C-07926CEE5557}"/>
                 </a:ext>
                 <a:ext uri="{C183D7F6-B498-43B3-948B-1728B52AA6E4}">
-                  <adec:decorative xmlns="" xmlns:adec="http://schemas.microsoft.com/office/drawing/2017/decorative" val="1"/>
+                  <adec:decorative xmlns:adec="http://schemas.microsoft.com/office/drawing/2017/decorative" val="1"/>
                 </a:ext>
               </a:extLst>
             </p:cNvPr>
@@ -13271,7 +13188,7 @@
                   <a16:creationId xmlns:a16="http://schemas.microsoft.com/office/drawing/2014/main" id="{9301F039-B467-413A-B25C-770E51069D42}"/>
                 </a:ext>
                 <a:ext uri="{C183D7F6-B498-43B3-948B-1728B52AA6E4}">
-                  <adec:decorative xmlns="" xmlns:adec="http://schemas.microsoft.com/office/drawing/2017/decorative" val="1"/>
+                  <adec:decorative xmlns:adec="http://schemas.microsoft.com/office/drawing/2017/decorative" val="1"/>
                 </a:ext>
               </a:extLst>
             </p:cNvPr>
@@ -13335,7 +13252,7 @@
                   <a16:creationId xmlns:a16="http://schemas.microsoft.com/office/drawing/2014/main" id="{9F06AEC1-5558-49E8-8CAC-FEBD00DF0031}"/>
                 </a:ext>
                 <a:ext uri="{C183D7F6-B498-43B3-948B-1728B52AA6E4}">
-                  <adec:decorative xmlns="" xmlns:adec="http://schemas.microsoft.com/office/drawing/2017/decorative" val="1"/>
+                  <adec:decorative xmlns:adec="http://schemas.microsoft.com/office/drawing/2017/decorative" val="1"/>
                 </a:ext>
               </a:extLst>
             </p:cNvPr>
@@ -13396,7 +13313,7 @@
                   <a16:creationId xmlns:a16="http://schemas.microsoft.com/office/drawing/2014/main" id="{D10B76B9-BA68-471E-B58C-ED91198A9FAB}"/>
                 </a:ext>
                 <a:ext uri="{C183D7F6-B498-43B3-948B-1728B52AA6E4}">
-                  <adec:decorative xmlns="" xmlns:adec="http://schemas.microsoft.com/office/drawing/2017/decorative" val="1"/>
+                  <adec:decorative xmlns:adec="http://schemas.microsoft.com/office/drawing/2017/decorative" val="1"/>
                 </a:ext>
               </a:extLst>
             </p:cNvPr>
@@ -13456,7 +13373,7 @@
                   <a16:creationId xmlns:a16="http://schemas.microsoft.com/office/drawing/2014/main" id="{FEB3913B-54A3-490E-BA4B-5D0330990FCB}"/>
                 </a:ext>
                 <a:ext uri="{C183D7F6-B498-43B3-948B-1728B52AA6E4}">
-                  <adec:decorative xmlns="" xmlns:adec="http://schemas.microsoft.com/office/drawing/2017/decorative" val="1"/>
+                  <adec:decorative xmlns:adec="http://schemas.microsoft.com/office/drawing/2017/decorative" val="1"/>
                 </a:ext>
               </a:extLst>
             </p:cNvPr>
@@ -13522,7 +13439,7 @@
                   <a16:creationId xmlns:a16="http://schemas.microsoft.com/office/drawing/2014/main" id="{F75DC961-08A4-46F8-8A80-2E1FB977E1F4}"/>
                 </a:ext>
                 <a:ext uri="{C183D7F6-B498-43B3-948B-1728B52AA6E4}">
-                  <adec:decorative xmlns="" xmlns:adec="http://schemas.microsoft.com/office/drawing/2017/decorative" val="1"/>
+                  <adec:decorative xmlns:adec="http://schemas.microsoft.com/office/drawing/2017/decorative" val="1"/>
                 </a:ext>
               </a:extLst>
             </p:cNvPr>
@@ -13639,13 +13556,6 @@
   <p:clrMapOvr>
     <a:masterClrMapping/>
   </p:clrMapOvr>
-  <p:timing>
-    <p:tnLst>
-      <p:par>
-        <p:cTn id="1" dur="indefinite" restart="never" nodeType="tmRoot"/>
-      </p:par>
-    </p:tnLst>
-  </p:timing>
 </p:sld>
 </file>
 

</xml_diff>